<commit_message>
Updated banner and icon
</commit_message>
<xml_diff>
--- a/assets/img/eppmc_logo.pptx
+++ b/assets/img/eppmc_logo.pptx
@@ -6,6 +6,7 @@
   </p:sldMasterIdLst>
   <p:sldIdLst>
     <p:sldId id="256" r:id="rId2"/>
+    <p:sldId id="257" r:id="rId3"/>
   </p:sldIdLst>
   <p:sldSz cx="12192000" cy="6858000"/>
   <p:notesSz cx="6858000" cy="9144000"/>
@@ -104,6 +105,11 @@
       </a:defRPr>
     </a:lvl9pPr>
   </p:defaultTextStyle>
+  <p:extLst>
+    <p:ext uri="{EFAFB233-063F-42B5-8137-9DF3F51BA10A}">
+      <p15:sldGuideLst xmlns:p15="http://schemas.microsoft.com/office/powerpoint/2012/main"/>
+    </p:ext>
+  </p:extLst>
 </p:presentation>
 </file>
 
@@ -3321,6 +3327,60 @@
           <a:chExt cx="0" cy="0"/>
         </a:xfrm>
       </p:grpSpPr>
+      <p:sp>
+        <p:nvSpPr>
+          <p:cNvPr id="2" name="Rectangle 1">
+            <a:extLst>
+              <a:ext uri="{FF2B5EF4-FFF2-40B4-BE49-F238E27FC236}">
+                <a16:creationId xmlns:a16="http://schemas.microsoft.com/office/drawing/2014/main" id="{18030FE8-E3AF-B4A5-8BBF-8C85AE4D6A81}"/>
+              </a:ext>
+            </a:extLst>
+          </p:cNvPr>
+          <p:cNvSpPr/>
+          <p:nvPr/>
+        </p:nvSpPr>
+        <p:spPr>
+          <a:xfrm>
+            <a:off x="2285804" y="2709333"/>
+            <a:ext cx="7620392" cy="2742246"/>
+          </a:xfrm>
+          <a:prstGeom prst="rect">
+            <a:avLst/>
+          </a:prstGeom>
+          <a:solidFill>
+            <a:srgbClr val="F1F1F1"/>
+          </a:solidFill>
+          <a:ln w="57150">
+            <a:solidFill>
+              <a:srgbClr val="2F528F"/>
+            </a:solidFill>
+          </a:ln>
+        </p:spPr>
+        <p:style>
+          <a:lnRef idx="2">
+            <a:schemeClr val="accent1">
+              <a:shade val="50000"/>
+            </a:schemeClr>
+          </a:lnRef>
+          <a:fillRef idx="1">
+            <a:schemeClr val="accent1"/>
+          </a:fillRef>
+          <a:effectRef idx="0">
+            <a:schemeClr val="accent1"/>
+          </a:effectRef>
+          <a:fontRef idx="minor">
+            <a:schemeClr val="lt1"/>
+          </a:fontRef>
+        </p:style>
+        <p:txBody>
+          <a:bodyPr rtlCol="0" anchor="ctr"/>
+          <a:lstStyle/>
+          <a:p>
+            <a:pPr algn="ctr"/>
+            <a:endParaRPr lang="en-US"/>
+          </a:p>
+        </p:txBody>
+      </p:sp>
       <p:pic>
         <p:nvPicPr>
           <p:cNvPr id="4" name="Picture 3" descr="A picture containing blue, colorful&#10;&#10;Description automatically generated">
@@ -3343,8 +3403,166 @@
         </p:blipFill>
         <p:spPr>
           <a:xfrm>
-            <a:off x="3404567" y="551721"/>
-            <a:ext cx="4619625" cy="4981575"/>
+            <a:off x="7572587" y="2944557"/>
+            <a:ext cx="2299744" cy="2479930"/>
+          </a:xfrm>
+          <a:prstGeom prst="rect">
+            <a:avLst/>
+          </a:prstGeom>
+        </p:spPr>
+      </p:pic>
+      <p:sp>
+        <p:nvSpPr>
+          <p:cNvPr id="6" name="TextBox 5">
+            <a:extLst>
+              <a:ext uri="{FF2B5EF4-FFF2-40B4-BE49-F238E27FC236}">
+                <a16:creationId xmlns:a16="http://schemas.microsoft.com/office/drawing/2014/main" id="{09FB46F4-2C95-6C59-F7DD-FE96E1B729B7}"/>
+              </a:ext>
+            </a:extLst>
+          </p:cNvPr>
+          <p:cNvSpPr txBox="1"/>
+          <p:nvPr/>
+        </p:nvSpPr>
+        <p:spPr>
+          <a:xfrm>
+            <a:off x="2607733" y="3600766"/>
+            <a:ext cx="4964854" cy="1077218"/>
+          </a:xfrm>
+          <a:prstGeom prst="rect">
+            <a:avLst/>
+          </a:prstGeom>
+          <a:noFill/>
+        </p:spPr>
+        <p:txBody>
+          <a:bodyPr wrap="square" rtlCol="0">
+            <a:spAutoFit/>
+          </a:bodyPr>
+          <a:lstStyle/>
+          <a:p>
+            <a:r>
+              <a:rPr lang="en-US" sz="3200" b="1" dirty="0">
+                <a:solidFill>
+                  <a:srgbClr val="B72473"/>
+                </a:solidFill>
+                <a:latin typeface="Quattrocento Sans" panose="020B0502050000020003" pitchFamily="34" charset="0"/>
+              </a:rPr>
+              <a:t>Emotion Phenomenology and Physiology Challenge</a:t>
+            </a:r>
+            <a:endParaRPr lang="en-US" sz="2400" b="1" dirty="0">
+              <a:solidFill>
+                <a:srgbClr val="B72473"/>
+              </a:solidFill>
+              <a:latin typeface="Quattrocento Sans" panose="020B0502050000020003" pitchFamily="34" charset="0"/>
+            </a:endParaRPr>
+          </a:p>
+        </p:txBody>
+      </p:sp>
+    </p:spTree>
+    <p:extLst>
+      <p:ext uri="{BB962C8B-B14F-4D97-AF65-F5344CB8AC3E}">
+        <p14:creationId xmlns:p14="http://schemas.microsoft.com/office/powerpoint/2010/main" val="94699811"/>
+      </p:ext>
+    </p:extLst>
+  </p:cSld>
+  <p:clrMapOvr>
+    <a:masterClrMapping/>
+  </p:clrMapOvr>
+</p:sld>
+</file>
+
+<file path=ppt/slides/slide2.xml><?xml version="1.0" encoding="utf-8"?>
+<p:sld xmlns:a="http://schemas.openxmlformats.org/drawingml/2006/main" xmlns:r="http://schemas.openxmlformats.org/officeDocument/2006/relationships" xmlns:p="http://schemas.openxmlformats.org/presentationml/2006/main">
+  <p:cSld>
+    <p:spTree>
+      <p:nvGrpSpPr>
+        <p:cNvPr id="1" name=""/>
+        <p:cNvGrpSpPr/>
+        <p:nvPr/>
+      </p:nvGrpSpPr>
+      <p:grpSpPr>
+        <a:xfrm>
+          <a:off x="0" y="0"/>
+          <a:ext cx="0" cy="0"/>
+          <a:chOff x="0" y="0"/>
+          <a:chExt cx="0" cy="0"/>
+        </a:xfrm>
+      </p:grpSpPr>
+      <p:sp>
+        <p:nvSpPr>
+          <p:cNvPr id="3" name="Rectangle 2">
+            <a:extLst>
+              <a:ext uri="{FF2B5EF4-FFF2-40B4-BE49-F238E27FC236}">
+                <a16:creationId xmlns:a16="http://schemas.microsoft.com/office/drawing/2014/main" id="{8713DF3F-5A35-16E0-703E-5B092DB6C45E}"/>
+              </a:ext>
+            </a:extLst>
+          </p:cNvPr>
+          <p:cNvSpPr/>
+          <p:nvPr/>
+        </p:nvSpPr>
+        <p:spPr>
+          <a:xfrm>
+            <a:off x="4721959" y="1828800"/>
+            <a:ext cx="3200400" cy="3200400"/>
+          </a:xfrm>
+          <a:prstGeom prst="rect">
+            <a:avLst/>
+          </a:prstGeom>
+          <a:solidFill>
+            <a:schemeClr val="bg1"/>
+          </a:solidFill>
+          <a:ln w="57150">
+            <a:noFill/>
+          </a:ln>
+        </p:spPr>
+        <p:style>
+          <a:lnRef idx="2">
+            <a:schemeClr val="accent1">
+              <a:shade val="50000"/>
+            </a:schemeClr>
+          </a:lnRef>
+          <a:fillRef idx="1">
+            <a:schemeClr val="accent1"/>
+          </a:fillRef>
+          <a:effectRef idx="0">
+            <a:schemeClr val="accent1"/>
+          </a:effectRef>
+          <a:fontRef idx="minor">
+            <a:schemeClr val="lt1"/>
+          </a:fontRef>
+        </p:style>
+        <p:txBody>
+          <a:bodyPr rtlCol="0" anchor="ctr"/>
+          <a:lstStyle/>
+          <a:p>
+            <a:pPr algn="ctr"/>
+            <a:endParaRPr lang="en-US"/>
+          </a:p>
+        </p:txBody>
+      </p:sp>
+      <p:pic>
+        <p:nvPicPr>
+          <p:cNvPr id="4" name="Picture 3" descr="A picture containing blue, colorful&#10;&#10;Description automatically generated">
+            <a:extLst>
+              <a:ext uri="{FF2B5EF4-FFF2-40B4-BE49-F238E27FC236}">
+                <a16:creationId xmlns:a16="http://schemas.microsoft.com/office/drawing/2014/main" id="{3CCAEDE5-AD0D-CC85-BD9B-12C86E0E3A00}"/>
+              </a:ext>
+            </a:extLst>
+          </p:cNvPr>
+          <p:cNvPicPr>
+            <a:picLocks noChangeAspect="1"/>
+          </p:cNvPicPr>
+          <p:nvPr/>
+        </p:nvPicPr>
+        <p:blipFill>
+          <a:blip r:embed="rId2"/>
+          <a:stretch>
+            <a:fillRect/>
+          </a:stretch>
+        </p:blipFill>
+        <p:spPr>
+          <a:xfrm>
+            <a:off x="5172287" y="2189035"/>
+            <a:ext cx="2299744" cy="2479930"/>
           </a:xfrm>
           <a:prstGeom prst="rect">
             <a:avLst/>
@@ -3354,7 +3572,7 @@
     </p:spTree>
     <p:extLst>
       <p:ext uri="{BB962C8B-B14F-4D97-AF65-F5344CB8AC3E}">
-        <p14:creationId xmlns:p14="http://schemas.microsoft.com/office/powerpoint/2010/main" val="94699811"/>
+        <p14:creationId xmlns:p14="http://schemas.microsoft.com/office/powerpoint/2010/main" val="2451569942"/>
       </p:ext>
     </p:extLst>
   </p:cSld>

</xml_diff>

<commit_message>
Updated avatar and banner
</commit_message>
<xml_diff>
--- a/assets/img/eppmc_logo.pptx
+++ b/assets/img/eppmc_logo.pptx
@@ -3501,8 +3501,8 @@
         </p:nvSpPr>
         <p:spPr>
           <a:xfrm>
-            <a:off x="4721959" y="1828800"/>
-            <a:ext cx="3200400" cy="3200400"/>
+            <a:off x="4982816" y="2235003"/>
+            <a:ext cx="1828800" cy="1828800"/>
           </a:xfrm>
           <a:prstGeom prst="rect">
             <a:avLst/>
@@ -3561,8 +3561,8 @@
         </p:blipFill>
         <p:spPr>
           <a:xfrm>
-            <a:off x="5172287" y="2189035"/>
-            <a:ext cx="2299744" cy="2479930"/>
+            <a:off x="5277651" y="2481295"/>
+            <a:ext cx="1239130" cy="1336216"/>
           </a:xfrm>
           <a:prstGeom prst="rect">
             <a:avLst/>

</xml_diff>